<commit_message>
added in bias variance trade off comments and analogy and started the similar work section
</commit_message>
<xml_diff>
--- a/paperscreenshots/figurecollages.pptx
+++ b/paperscreenshots/figurecollages.pptx
@@ -8,6 +8,7 @@
     <p:sldId id="256" r:id="rId2"/>
     <p:sldId id="257" r:id="rId3"/>
     <p:sldId id="258" r:id="rId4"/>
+    <p:sldId id="259" r:id="rId5"/>
   </p:sldIdLst>
   <p:sldSz cx="12192000" cy="6858000"/>
   <p:notesSz cx="6858000" cy="9144000"/>
@@ -106,6 +107,11 @@
       </a:defRPr>
     </a:lvl9pPr>
   </p:defaultTextStyle>
+  <p:extLst>
+    <p:ext uri="{EFAFB233-063F-42B5-8137-9DF3F51BA10A}">
+      <p15:sldGuideLst xmlns:p15="http://schemas.microsoft.com/office/powerpoint/2012/main"/>
+    </p:ext>
+  </p:extLst>
 </p:presentation>
 </file>
 
@@ -258,7 +264,7 @@
           <a:p>
             <a:fld id="{841C83C9-74AD-844B-BAC2-D5BE7508E1B4}" type="datetimeFigureOut">
               <a:rPr lang="en-US" smtClean="0"/>
-              <a:t>1/31/24</a:t>
+              <a:t>2/6/24</a:t>
             </a:fld>
             <a:endParaRPr lang="en-US"/>
           </a:p>
@@ -458,7 +464,7 @@
           <a:p>
             <a:fld id="{841C83C9-74AD-844B-BAC2-D5BE7508E1B4}" type="datetimeFigureOut">
               <a:rPr lang="en-US" smtClean="0"/>
-              <a:t>1/31/24</a:t>
+              <a:t>2/6/24</a:t>
             </a:fld>
             <a:endParaRPr lang="en-US"/>
           </a:p>
@@ -668,7 +674,7 @@
           <a:p>
             <a:fld id="{841C83C9-74AD-844B-BAC2-D5BE7508E1B4}" type="datetimeFigureOut">
               <a:rPr lang="en-US" smtClean="0"/>
-              <a:t>1/31/24</a:t>
+              <a:t>2/6/24</a:t>
             </a:fld>
             <a:endParaRPr lang="en-US"/>
           </a:p>
@@ -868,7 +874,7 @@
           <a:p>
             <a:fld id="{841C83C9-74AD-844B-BAC2-D5BE7508E1B4}" type="datetimeFigureOut">
               <a:rPr lang="en-US" smtClean="0"/>
-              <a:t>1/31/24</a:t>
+              <a:t>2/6/24</a:t>
             </a:fld>
             <a:endParaRPr lang="en-US"/>
           </a:p>
@@ -1144,7 +1150,7 @@
           <a:p>
             <a:fld id="{841C83C9-74AD-844B-BAC2-D5BE7508E1B4}" type="datetimeFigureOut">
               <a:rPr lang="en-US" smtClean="0"/>
-              <a:t>1/31/24</a:t>
+              <a:t>2/6/24</a:t>
             </a:fld>
             <a:endParaRPr lang="en-US"/>
           </a:p>
@@ -1412,7 +1418,7 @@
           <a:p>
             <a:fld id="{841C83C9-74AD-844B-BAC2-D5BE7508E1B4}" type="datetimeFigureOut">
               <a:rPr lang="en-US" smtClean="0"/>
-              <a:t>1/31/24</a:t>
+              <a:t>2/6/24</a:t>
             </a:fld>
             <a:endParaRPr lang="en-US"/>
           </a:p>
@@ -1827,7 +1833,7 @@
           <a:p>
             <a:fld id="{841C83C9-74AD-844B-BAC2-D5BE7508E1B4}" type="datetimeFigureOut">
               <a:rPr lang="en-US" smtClean="0"/>
-              <a:t>1/31/24</a:t>
+              <a:t>2/6/24</a:t>
             </a:fld>
             <a:endParaRPr lang="en-US"/>
           </a:p>
@@ -1969,7 +1975,7 @@
           <a:p>
             <a:fld id="{841C83C9-74AD-844B-BAC2-D5BE7508E1B4}" type="datetimeFigureOut">
               <a:rPr lang="en-US" smtClean="0"/>
-              <a:t>1/31/24</a:t>
+              <a:t>2/6/24</a:t>
             </a:fld>
             <a:endParaRPr lang="en-US"/>
           </a:p>
@@ -2082,7 +2088,7 @@
           <a:p>
             <a:fld id="{841C83C9-74AD-844B-BAC2-D5BE7508E1B4}" type="datetimeFigureOut">
               <a:rPr lang="en-US" smtClean="0"/>
-              <a:t>1/31/24</a:t>
+              <a:t>2/6/24</a:t>
             </a:fld>
             <a:endParaRPr lang="en-US"/>
           </a:p>
@@ -2395,7 +2401,7 @@
           <a:p>
             <a:fld id="{841C83C9-74AD-844B-BAC2-D5BE7508E1B4}" type="datetimeFigureOut">
               <a:rPr lang="en-US" smtClean="0"/>
-              <a:t>1/31/24</a:t>
+              <a:t>2/6/24</a:t>
             </a:fld>
             <a:endParaRPr lang="en-US"/>
           </a:p>
@@ -2684,7 +2690,7 @@
           <a:p>
             <a:fld id="{841C83C9-74AD-844B-BAC2-D5BE7508E1B4}" type="datetimeFigureOut">
               <a:rPr lang="en-US" smtClean="0"/>
-              <a:t>1/31/24</a:t>
+              <a:t>2/6/24</a:t>
             </a:fld>
             <a:endParaRPr lang="en-US"/>
           </a:p>
@@ -2927,7 +2933,7 @@
           <a:p>
             <a:fld id="{841C83C9-74AD-844B-BAC2-D5BE7508E1B4}" type="datetimeFigureOut">
               <a:rPr lang="en-US" smtClean="0"/>
-              <a:t>1/31/24</a:t>
+              <a:t>2/6/24</a:t>
             </a:fld>
             <a:endParaRPr lang="en-US"/>
           </a:p>
@@ -3897,6 +3903,156 @@
 </p:sld>
 </file>
 
+<file path=ppt/slides/slide4.xml><?xml version="1.0" encoding="utf-8"?>
+<p:sld xmlns:a="http://schemas.openxmlformats.org/drawingml/2006/main" xmlns:r="http://schemas.openxmlformats.org/officeDocument/2006/relationships" xmlns:p="http://schemas.openxmlformats.org/presentationml/2006/main">
+  <p:cSld>
+    <p:spTree>
+      <p:nvGrpSpPr>
+        <p:cNvPr id="1" name=""/>
+        <p:cNvGrpSpPr/>
+        <p:nvPr/>
+      </p:nvGrpSpPr>
+      <p:grpSpPr>
+        <a:xfrm>
+          <a:off x="0" y="0"/>
+          <a:ext cx="0" cy="0"/>
+          <a:chOff x="0" y="0"/>
+          <a:chExt cx="0" cy="0"/>
+        </a:xfrm>
+      </p:grpSpPr>
+      <p:pic>
+        <p:nvPicPr>
+          <p:cNvPr id="5" name="Picture 4" descr="A diagram of a small town&#10;&#10;Description automatically generated with medium confidence">
+            <a:extLst>
+              <a:ext uri="{FF2B5EF4-FFF2-40B4-BE49-F238E27FC236}">
+                <a16:creationId xmlns:a16="http://schemas.microsoft.com/office/drawing/2014/main" id="{A1CC4212-5B75-42D6-C90F-F9F6DDCAEF7B}"/>
+              </a:ext>
+            </a:extLst>
+          </p:cNvPr>
+          <p:cNvPicPr>
+            <a:picLocks noChangeAspect="1"/>
+          </p:cNvPicPr>
+          <p:nvPr/>
+        </p:nvPicPr>
+        <p:blipFill>
+          <a:blip r:embed="rId2"/>
+          <a:stretch>
+            <a:fillRect/>
+          </a:stretch>
+        </p:blipFill>
+        <p:spPr>
+          <a:xfrm>
+            <a:off x="2473783" y="0"/>
+            <a:ext cx="4342730" cy="4261757"/>
+          </a:xfrm>
+          <a:prstGeom prst="rect">
+            <a:avLst/>
+          </a:prstGeom>
+        </p:spPr>
+      </p:pic>
+      <p:pic>
+        <p:nvPicPr>
+          <p:cNvPr id="7" name="Picture 6" descr="A diagram of a diagram of a problem&#10;&#10;Description automatically generated with medium confidence">
+            <a:extLst>
+              <a:ext uri="{FF2B5EF4-FFF2-40B4-BE49-F238E27FC236}">
+                <a16:creationId xmlns:a16="http://schemas.microsoft.com/office/drawing/2014/main" id="{8B4A818B-6C3E-D1F0-5EE4-3A3DF74967CD}"/>
+              </a:ext>
+            </a:extLst>
+          </p:cNvPr>
+          <p:cNvPicPr>
+            <a:picLocks noChangeAspect="1"/>
+          </p:cNvPicPr>
+          <p:nvPr/>
+        </p:nvPicPr>
+        <p:blipFill>
+          <a:blip r:embed="rId3"/>
+          <a:stretch>
+            <a:fillRect/>
+          </a:stretch>
+        </p:blipFill>
+        <p:spPr>
+          <a:xfrm>
+            <a:off x="4728949" y="3054072"/>
+            <a:ext cx="3596080" cy="3714750"/>
+          </a:xfrm>
+          <a:prstGeom prst="rect">
+            <a:avLst/>
+          </a:prstGeom>
+        </p:spPr>
+      </p:pic>
+      <p:pic>
+        <p:nvPicPr>
+          <p:cNvPr id="9" name="Picture 8" descr="A diagram of a tree diagram&#10;&#10;Description automatically generated with medium confidence">
+            <a:extLst>
+              <a:ext uri="{FF2B5EF4-FFF2-40B4-BE49-F238E27FC236}">
+                <a16:creationId xmlns:a16="http://schemas.microsoft.com/office/drawing/2014/main" id="{D15373B5-2888-3DD0-1095-D22FA2CC7FA7}"/>
+              </a:ext>
+            </a:extLst>
+          </p:cNvPr>
+          <p:cNvPicPr>
+            <a:picLocks noChangeAspect="1"/>
+          </p:cNvPicPr>
+          <p:nvPr/>
+        </p:nvPicPr>
+        <p:blipFill>
+          <a:blip r:embed="rId4"/>
+          <a:stretch>
+            <a:fillRect/>
+          </a:stretch>
+        </p:blipFill>
+        <p:spPr>
+          <a:xfrm>
+            <a:off x="629780" y="1979106"/>
+            <a:ext cx="4099169" cy="3903785"/>
+          </a:xfrm>
+          <a:prstGeom prst="rect">
+            <a:avLst/>
+          </a:prstGeom>
+        </p:spPr>
+      </p:pic>
+      <p:pic>
+        <p:nvPicPr>
+          <p:cNvPr id="11" name="Picture 10" descr="A diagram of a diagram of a village&#10;&#10;Description automatically generated with medium confidence">
+            <a:extLst>
+              <a:ext uri="{FF2B5EF4-FFF2-40B4-BE49-F238E27FC236}">
+                <a16:creationId xmlns:a16="http://schemas.microsoft.com/office/drawing/2014/main" id="{A0EE08AB-6DB9-7D62-BBD5-A99320938F01}"/>
+              </a:ext>
+            </a:extLst>
+          </p:cNvPr>
+          <p:cNvPicPr>
+            <a:picLocks noChangeAspect="1"/>
+          </p:cNvPicPr>
+          <p:nvPr/>
+        </p:nvPicPr>
+        <p:blipFill>
+          <a:blip r:embed="rId5"/>
+          <a:stretch>
+            <a:fillRect/>
+          </a:stretch>
+        </p:blipFill>
+        <p:spPr>
+          <a:xfrm>
+            <a:off x="6410982" y="0"/>
+            <a:ext cx="4061834" cy="4082143"/>
+          </a:xfrm>
+          <a:prstGeom prst="rect">
+            <a:avLst/>
+          </a:prstGeom>
+        </p:spPr>
+      </p:pic>
+    </p:spTree>
+    <p:extLst>
+      <p:ext uri="{BB962C8B-B14F-4D97-AF65-F5344CB8AC3E}">
+        <p14:creationId xmlns:p14="http://schemas.microsoft.com/office/powerpoint/2010/main" val="1110750264"/>
+      </p:ext>
+    </p:extLst>
+  </p:cSld>
+  <p:clrMapOvr>
+    <a:masterClrMapping/>
+  </p:clrMapOvr>
+</p:sld>
+</file>
+
 <file path=ppt/theme/theme1.xml><?xml version="1.0" encoding="utf-8"?>
 <a:theme xmlns:a="http://schemas.openxmlformats.org/drawingml/2006/main" name="Office Theme">
   <a:themeElements>

</xml_diff>